<commit_message>
added additional details to images showing changes to the temporary part of the run-time stack
</commit_message>
<xml_diff>
--- a/PowerPoint Slides/10 - CVM.pptx
+++ b/PowerPoint Slides/10 - CVM.pptx
@@ -9106,10 +9106,10 @@
       </p:sp>
       <p:grpSp>
         <p:nvGrpSpPr>
-          <p:cNvPr id="10" name="Group 9">
+          <p:cNvPr id="3" name="Group 2">
             <a:extLst>
               <a:ext uri="{FF2B5EF4-FFF2-40B4-BE49-F238E27FC236}">
-                <a16:creationId xmlns:a16="http://schemas.microsoft.com/office/drawing/2014/main" id="{B9E0D969-7059-4BC1-9D33-1F9B63DA8B10}"/>
+                <a16:creationId xmlns:a16="http://schemas.microsoft.com/office/drawing/2014/main" id="{9F2AB4BD-73DD-4267-9120-A4FA0EC125B6}"/>
               </a:ext>
             </a:extLst>
           </p:cNvPr>
@@ -9118,10 +9118,10 @@
         </p:nvGrpSpPr>
         <p:grpSpPr>
           <a:xfrm>
-            <a:off x="1676400" y="1981200"/>
-            <a:ext cx="4419600" cy="4023360"/>
-            <a:chOff x="1676400" y="1981200"/>
-            <a:chExt cx="4419600" cy="4023360"/>
+            <a:off x="1676400" y="1877696"/>
+            <a:ext cx="6009267" cy="4126864"/>
+            <a:chOff x="1676400" y="1877696"/>
+            <a:chExt cx="6009267" cy="4126864"/>
           </a:xfrm>
         </p:grpSpPr>
         <p:sp>
@@ -9185,7 +9185,7 @@
           </p:nvSpPr>
           <p:spPr>
             <a:xfrm>
-              <a:off x="1893570" y="3300413"/>
+              <a:off x="1893570" y="3124200"/>
               <a:ext cx="1402948" cy="646331"/>
             </a:xfrm>
             <a:prstGeom prst="rect">
@@ -9269,8 +9269,8 @@
           </p:nvCxnSpPr>
           <p:spPr bwMode="auto">
             <a:xfrm>
-              <a:off x="2595044" y="3946744"/>
-              <a:ext cx="0" cy="1737776"/>
+              <a:off x="2595044" y="3770531"/>
+              <a:ext cx="0" cy="1913989"/>
             </a:xfrm>
             <a:prstGeom prst="straightConnector1">
               <a:avLst/>
@@ -9811,6 +9811,92 @@
             <a:effectLst/>
           </p:spPr>
         </p:cxnSp>
+        <p:sp>
+          <p:nvSpPr>
+            <p:cNvPr id="25" name="TextBox 24">
+              <a:extLst>
+                <a:ext uri="{FF2B5EF4-FFF2-40B4-BE49-F238E27FC236}">
+                  <a16:creationId xmlns:a16="http://schemas.microsoft.com/office/drawing/2014/main" id="{67925459-FD3C-4AAB-A53F-5E490597C6B4}"/>
+                </a:ext>
+              </a:extLst>
+            </p:cNvPr>
+            <p:cNvSpPr txBox="1"/>
+            <p:nvPr/>
+          </p:nvSpPr>
+          <p:spPr>
+            <a:xfrm>
+              <a:off x="5791200" y="3124200"/>
+              <a:ext cx="1685077" cy="646331"/>
+            </a:xfrm>
+            <a:prstGeom prst="rect">
+              <a:avLst/>
+            </a:prstGeom>
+            <a:noFill/>
+          </p:spPr>
+          <p:txBody>
+            <a:bodyPr wrap="none" rtlCol="0">
+              <a:spAutoFit/>
+            </a:bodyPr>
+            <a:lstStyle/>
+            <a:p>
+              <a:pPr algn="l"/>
+              <a:r>
+                <a:rPr lang="en-US" sz="1800" dirty="0"/>
+                <a:t>temporary part</a:t>
+              </a:r>
+            </a:p>
+            <a:p>
+              <a:pPr algn="l"/>
+              <a:r>
+                <a:rPr lang="en-US" sz="1800" dirty="0"/>
+                <a:t>is empty</a:t>
+              </a:r>
+            </a:p>
+          </p:txBody>
+        </p:sp>
+        <p:sp>
+          <p:nvSpPr>
+            <p:cNvPr id="26" name="TextBox 25">
+              <a:extLst>
+                <a:ext uri="{FF2B5EF4-FFF2-40B4-BE49-F238E27FC236}">
+                  <a16:creationId xmlns:a16="http://schemas.microsoft.com/office/drawing/2014/main" id="{37BF265A-5500-42CD-B280-3196C06F7226}"/>
+                </a:ext>
+              </a:extLst>
+            </p:cNvPr>
+            <p:cNvSpPr txBox="1"/>
+            <p:nvPr/>
+          </p:nvSpPr>
+          <p:spPr>
+            <a:xfrm>
+              <a:off x="6346839" y="1877696"/>
+              <a:ext cx="1338828" cy="646331"/>
+            </a:xfrm>
+            <a:prstGeom prst="rect">
+              <a:avLst/>
+            </a:prstGeom>
+            <a:noFill/>
+          </p:spPr>
+          <p:txBody>
+            <a:bodyPr wrap="none" rtlCol="0">
+              <a:spAutoFit/>
+            </a:bodyPr>
+            <a:lstStyle/>
+            <a:p>
+              <a:pPr algn="l"/>
+              <a:r>
+                <a:rPr lang="en-US" sz="1800" dirty="0"/>
+                <a:t>value of x</a:t>
+              </a:r>
+            </a:p>
+            <a:p>
+              <a:pPr algn="l"/>
+              <a:r>
+                <a:rPr lang="en-US" sz="1800" dirty="0"/>
+                <a:t>is unknown</a:t>
+              </a:r>
+            </a:p>
+          </p:txBody>
+        </p:sp>
       </p:grpSp>
     </p:spTree>
     <p:extLst>
@@ -9961,10 +10047,10 @@
       </p:sp>
       <p:grpSp>
         <p:nvGrpSpPr>
-          <p:cNvPr id="8" name="Group 7">
+          <p:cNvPr id="5" name="Group 4">
             <a:extLst>
               <a:ext uri="{FF2B5EF4-FFF2-40B4-BE49-F238E27FC236}">
-                <a16:creationId xmlns:a16="http://schemas.microsoft.com/office/drawing/2014/main" id="{DF7755C5-D692-449C-98FE-DFDF465D3DCD}"/>
+                <a16:creationId xmlns:a16="http://schemas.microsoft.com/office/drawing/2014/main" id="{F1FD2248-2BA5-4470-AB7C-25B59C1FD203}"/>
               </a:ext>
             </a:extLst>
           </p:cNvPr>
@@ -9974,9 +10060,9 @@
         <p:grpSpPr>
           <a:xfrm>
             <a:off x="1676400" y="1981200"/>
-            <a:ext cx="4419600" cy="4023360"/>
+            <a:ext cx="6019800" cy="4023360"/>
             <a:chOff x="1676400" y="1981200"/>
-            <a:chExt cx="4419600" cy="4023360"/>
+            <a:chExt cx="6019800" cy="4023360"/>
           </a:xfrm>
         </p:grpSpPr>
         <p:sp>
@@ -10271,7 +10357,7 @@
           </p:nvSpPr>
           <p:spPr>
             <a:xfrm>
-              <a:off x="5791200" y="1986915"/>
+              <a:off x="5793559" y="1986915"/>
               <a:ext cx="300083" cy="369332"/>
             </a:xfrm>
             <a:prstGeom prst="rect">
@@ -10306,7 +10392,7 @@
           </p:nvSpPr>
           <p:spPr>
             <a:xfrm>
-              <a:off x="5795918" y="2357846"/>
+              <a:off x="5793559" y="2357846"/>
               <a:ext cx="300082" cy="369332"/>
             </a:xfrm>
             <a:prstGeom prst="rect">
@@ -10341,7 +10427,7 @@
           </p:nvSpPr>
           <p:spPr>
             <a:xfrm>
-              <a:off x="5795918" y="2733012"/>
+              <a:off x="5793559" y="2733012"/>
               <a:ext cx="300082" cy="369332"/>
             </a:xfrm>
             <a:prstGeom prst="rect">
@@ -10580,6 +10666,110 @@
               <a:r>
                 <a:rPr lang="en-US" sz="1800" dirty="0"/>
                 <a:t>112</a:t>
+              </a:r>
+            </a:p>
+          </p:txBody>
+        </p:sp>
+        <p:sp>
+          <p:nvSpPr>
+            <p:cNvPr id="24" name="Right Brace 23">
+              <a:extLst>
+                <a:ext uri="{FF2B5EF4-FFF2-40B4-BE49-F238E27FC236}">
+                  <a16:creationId xmlns:a16="http://schemas.microsoft.com/office/drawing/2014/main" id="{2770F285-E2D7-41C0-A0D8-400E207D6C00}"/>
+                </a:ext>
+              </a:extLst>
+            </p:cNvPr>
+            <p:cNvSpPr/>
+            <p:nvPr/>
+          </p:nvSpPr>
+          <p:spPr bwMode="auto">
+            <a:xfrm>
+              <a:off x="5867400" y="3080450"/>
+              <a:ext cx="152400" cy="369332"/>
+            </a:xfrm>
+            <a:prstGeom prst="rightBrace">
+              <a:avLst/>
+            </a:prstGeom>
+            <a:noFill/>
+            <a:ln w="9525" cap="flat" cmpd="sng" algn="ctr">
+              <a:solidFill>
+                <a:schemeClr val="tx1"/>
+              </a:solidFill>
+              <a:prstDash val="solid"/>
+              <a:round/>
+              <a:headEnd type="none" w="med" len="med"/>
+              <a:tailEnd type="none" w="med" len="med"/>
+            </a:ln>
+            <a:effectLst/>
+          </p:spPr>
+          <p:txBody>
+            <a:bodyPr vert="horz" wrap="none" lIns="92075" tIns="46038" rIns="92075" bIns="46038" numCol="1" rtlCol="0" anchor="ctr" anchorCtr="0" compatLnSpc="1">
+              <a:prstTxWarp prst="textNoShape">
+                <a:avLst/>
+              </a:prstTxWarp>
+            </a:bodyPr>
+            <a:lstStyle/>
+            <a:p>
+              <a:pPr marL="0" marR="0" indent="0" algn="ctr" defTabSz="914400" rtl="0" eaLnBrk="0" fontAlgn="base" latinLnBrk="0" hangingPunct="0">
+                <a:lnSpc>
+                  <a:spcPct val="100000"/>
+                </a:lnSpc>
+                <a:spcBef>
+                  <a:spcPct val="0"/>
+                </a:spcBef>
+                <a:spcAft>
+                  <a:spcPct val="0"/>
+                </a:spcAft>
+                <a:buClrTx/>
+                <a:buSzTx/>
+                <a:buFontTx/>
+                <a:buNone/>
+                <a:tabLst/>
+              </a:pPr>
+              <a:endParaRPr kumimoji="0" lang="en-US" sz="2400" b="0" i="0" u="none" strike="noStrike" cap="none" normalizeH="0" baseline="0">
+                <a:ln>
+                  <a:noFill/>
+                </a:ln>
+                <a:solidFill>
+                  <a:schemeClr val="tx1"/>
+                </a:solidFill>
+                <a:effectLst/>
+                <a:latin typeface="Arial" charset="0"/>
+              </a:endParaRPr>
+            </a:p>
+          </p:txBody>
+        </p:sp>
+        <p:sp>
+          <p:nvSpPr>
+            <p:cNvPr id="25" name="TextBox 24">
+              <a:extLst>
+                <a:ext uri="{FF2B5EF4-FFF2-40B4-BE49-F238E27FC236}">
+                  <a16:creationId xmlns:a16="http://schemas.microsoft.com/office/drawing/2014/main" id="{73A53278-1BAE-4620-94DA-F5DFC10A33BC}"/>
+                </a:ext>
+              </a:extLst>
+            </p:cNvPr>
+            <p:cNvSpPr txBox="1"/>
+            <p:nvPr/>
+          </p:nvSpPr>
+          <p:spPr>
+            <a:xfrm>
+              <a:off x="6011123" y="3080450"/>
+              <a:ext cx="1685077" cy="369332"/>
+            </a:xfrm>
+            <a:prstGeom prst="rect">
+              <a:avLst/>
+            </a:prstGeom>
+            <a:noFill/>
+          </p:spPr>
+          <p:txBody>
+            <a:bodyPr wrap="none" rtlCol="0">
+              <a:spAutoFit/>
+            </a:bodyPr>
+            <a:lstStyle/>
+            <a:p>
+              <a:r>
+                <a:rPr lang="en-US" sz="1800" dirty="0"/>
+                <a:t>temporary part</a:t>
               </a:r>
             </a:p>
           </p:txBody>
@@ -10952,10 +11142,10 @@
       </p:sp>
       <p:grpSp>
         <p:nvGrpSpPr>
-          <p:cNvPr id="20" name="Group 19">
+          <p:cNvPr id="3" name="Group 2">
             <a:extLst>
               <a:ext uri="{FF2B5EF4-FFF2-40B4-BE49-F238E27FC236}">
-                <a16:creationId xmlns:a16="http://schemas.microsoft.com/office/drawing/2014/main" id="{F5D32C62-B125-4EC9-B3D5-CC4281CAC50A}"/>
+                <a16:creationId xmlns:a16="http://schemas.microsoft.com/office/drawing/2014/main" id="{B7F3A6BE-238D-45BB-BB68-9FCD04985499}"/>
               </a:ext>
             </a:extLst>
           </p:cNvPr>
@@ -10965,9 +11155,9 @@
         <p:grpSpPr>
           <a:xfrm>
             <a:off x="1676400" y="1981200"/>
-            <a:ext cx="4419600" cy="4023360"/>
+            <a:ext cx="6019800" cy="4023360"/>
             <a:chOff x="1676400" y="1981200"/>
-            <a:chExt cx="4419600" cy="4023360"/>
+            <a:chExt cx="6019800" cy="4023360"/>
           </a:xfrm>
         </p:grpSpPr>
         <p:sp>
@@ -11653,6 +11843,110 @@
             <a:effectLst/>
           </p:spPr>
         </p:cxnSp>
+        <p:sp>
+          <p:nvSpPr>
+            <p:cNvPr id="27" name="Right Brace 26">
+              <a:extLst>
+                <a:ext uri="{FF2B5EF4-FFF2-40B4-BE49-F238E27FC236}">
+                  <a16:creationId xmlns:a16="http://schemas.microsoft.com/office/drawing/2014/main" id="{3C431937-A267-4E65-8F1F-71F1DE133CF4}"/>
+                </a:ext>
+              </a:extLst>
+            </p:cNvPr>
+            <p:cNvSpPr/>
+            <p:nvPr/>
+          </p:nvSpPr>
+          <p:spPr bwMode="auto">
+            <a:xfrm>
+              <a:off x="5867400" y="3080450"/>
+              <a:ext cx="152400" cy="731520"/>
+            </a:xfrm>
+            <a:prstGeom prst="rightBrace">
+              <a:avLst/>
+            </a:prstGeom>
+            <a:noFill/>
+            <a:ln w="9525" cap="flat" cmpd="sng" algn="ctr">
+              <a:solidFill>
+                <a:schemeClr val="tx1"/>
+              </a:solidFill>
+              <a:prstDash val="solid"/>
+              <a:round/>
+              <a:headEnd type="none" w="med" len="med"/>
+              <a:tailEnd type="none" w="med" len="med"/>
+            </a:ln>
+            <a:effectLst/>
+          </p:spPr>
+          <p:txBody>
+            <a:bodyPr vert="horz" wrap="none" lIns="92075" tIns="46038" rIns="92075" bIns="46038" numCol="1" rtlCol="0" anchor="ctr" anchorCtr="0" compatLnSpc="1">
+              <a:prstTxWarp prst="textNoShape">
+                <a:avLst/>
+              </a:prstTxWarp>
+            </a:bodyPr>
+            <a:lstStyle/>
+            <a:p>
+              <a:pPr marL="0" marR="0" indent="0" algn="ctr" defTabSz="914400" rtl="0" eaLnBrk="0" fontAlgn="base" latinLnBrk="0" hangingPunct="0">
+                <a:lnSpc>
+                  <a:spcPct val="100000"/>
+                </a:lnSpc>
+                <a:spcBef>
+                  <a:spcPct val="0"/>
+                </a:spcBef>
+                <a:spcAft>
+                  <a:spcPct val="0"/>
+                </a:spcAft>
+                <a:buClrTx/>
+                <a:buSzTx/>
+                <a:buFontTx/>
+                <a:buNone/>
+                <a:tabLst/>
+              </a:pPr>
+              <a:endParaRPr kumimoji="0" lang="en-US" sz="2400" b="0" i="0" u="none" strike="noStrike" cap="none" normalizeH="0" baseline="0">
+                <a:ln>
+                  <a:noFill/>
+                </a:ln>
+                <a:solidFill>
+                  <a:schemeClr val="tx1"/>
+                </a:solidFill>
+                <a:effectLst/>
+                <a:latin typeface="Arial" charset="0"/>
+              </a:endParaRPr>
+            </a:p>
+          </p:txBody>
+        </p:sp>
+        <p:sp>
+          <p:nvSpPr>
+            <p:cNvPr id="28" name="TextBox 27">
+              <a:extLst>
+                <a:ext uri="{FF2B5EF4-FFF2-40B4-BE49-F238E27FC236}">
+                  <a16:creationId xmlns:a16="http://schemas.microsoft.com/office/drawing/2014/main" id="{9BD300A6-8E24-4C77-9AA9-1985101F43B6}"/>
+                </a:ext>
+              </a:extLst>
+            </p:cNvPr>
+            <p:cNvSpPr txBox="1"/>
+            <p:nvPr/>
+          </p:nvSpPr>
+          <p:spPr>
+            <a:xfrm>
+              <a:off x="6011123" y="3261544"/>
+              <a:ext cx="1685077" cy="369332"/>
+            </a:xfrm>
+            <a:prstGeom prst="rect">
+              <a:avLst/>
+            </a:prstGeom>
+            <a:noFill/>
+          </p:spPr>
+          <p:txBody>
+            <a:bodyPr wrap="none" rtlCol="0">
+              <a:spAutoFit/>
+            </a:bodyPr>
+            <a:lstStyle/>
+            <a:p>
+              <a:r>
+                <a:rPr lang="en-US" sz="1800" dirty="0"/>
+                <a:t>temporary part</a:t>
+              </a:r>
+            </a:p>
+          </p:txBody>
+        </p:sp>
       </p:grpSp>
     </p:spTree>
     <p:extLst>
@@ -11803,10 +12097,10 @@
       </p:sp>
       <p:grpSp>
         <p:nvGrpSpPr>
-          <p:cNvPr id="7" name="Group 6">
+          <p:cNvPr id="3" name="Group 2">
             <a:extLst>
               <a:ext uri="{FF2B5EF4-FFF2-40B4-BE49-F238E27FC236}">
-                <a16:creationId xmlns:a16="http://schemas.microsoft.com/office/drawing/2014/main" id="{50D95A41-B876-4D61-B7C8-BEB6BBE12DA1}"/>
+                <a16:creationId xmlns:a16="http://schemas.microsoft.com/office/drawing/2014/main" id="{F20D00B3-416E-4D26-8580-AFCE491A25AE}"/>
               </a:ext>
             </a:extLst>
           </p:cNvPr>
@@ -11816,9 +12110,9 @@
         <p:grpSpPr>
           <a:xfrm>
             <a:off x="1676400" y="1981200"/>
-            <a:ext cx="4419600" cy="4023360"/>
+            <a:ext cx="6019800" cy="4023360"/>
             <a:chOff x="1676400" y="1981200"/>
-            <a:chExt cx="4419600" cy="4023360"/>
+            <a:chExt cx="6019800" cy="4023360"/>
           </a:xfrm>
         </p:grpSpPr>
         <p:sp>
@@ -12582,6 +12876,110 @@
             <a:effectLst/>
           </p:spPr>
         </p:cxnSp>
+        <p:sp>
+          <p:nvSpPr>
+            <p:cNvPr id="31" name="Right Brace 30">
+              <a:extLst>
+                <a:ext uri="{FF2B5EF4-FFF2-40B4-BE49-F238E27FC236}">
+                  <a16:creationId xmlns:a16="http://schemas.microsoft.com/office/drawing/2014/main" id="{B7B426D5-2208-4A68-9740-59E4AF708246}"/>
+                </a:ext>
+              </a:extLst>
+            </p:cNvPr>
+            <p:cNvSpPr/>
+            <p:nvPr/>
+          </p:nvSpPr>
+          <p:spPr bwMode="auto">
+            <a:xfrm>
+              <a:off x="5867400" y="3080450"/>
+              <a:ext cx="152400" cy="1097280"/>
+            </a:xfrm>
+            <a:prstGeom prst="rightBrace">
+              <a:avLst/>
+            </a:prstGeom>
+            <a:noFill/>
+            <a:ln w="9525" cap="flat" cmpd="sng" algn="ctr">
+              <a:solidFill>
+                <a:schemeClr val="tx1"/>
+              </a:solidFill>
+              <a:prstDash val="solid"/>
+              <a:round/>
+              <a:headEnd type="none" w="med" len="med"/>
+              <a:tailEnd type="none" w="med" len="med"/>
+            </a:ln>
+            <a:effectLst/>
+          </p:spPr>
+          <p:txBody>
+            <a:bodyPr vert="horz" wrap="none" lIns="92075" tIns="46038" rIns="92075" bIns="46038" numCol="1" rtlCol="0" anchor="ctr" anchorCtr="0" compatLnSpc="1">
+              <a:prstTxWarp prst="textNoShape">
+                <a:avLst/>
+              </a:prstTxWarp>
+            </a:bodyPr>
+            <a:lstStyle/>
+            <a:p>
+              <a:pPr marL="0" marR="0" indent="0" algn="ctr" defTabSz="914400" rtl="0" eaLnBrk="0" fontAlgn="base" latinLnBrk="0" hangingPunct="0">
+                <a:lnSpc>
+                  <a:spcPct val="100000"/>
+                </a:lnSpc>
+                <a:spcBef>
+                  <a:spcPct val="0"/>
+                </a:spcBef>
+                <a:spcAft>
+                  <a:spcPct val="0"/>
+                </a:spcAft>
+                <a:buClrTx/>
+                <a:buSzTx/>
+                <a:buFontTx/>
+                <a:buNone/>
+                <a:tabLst/>
+              </a:pPr>
+              <a:endParaRPr kumimoji="0" lang="en-US" sz="2400" b="0" i="0" u="none" strike="noStrike" cap="none" normalizeH="0" baseline="0">
+                <a:ln>
+                  <a:noFill/>
+                </a:ln>
+                <a:solidFill>
+                  <a:schemeClr val="tx1"/>
+                </a:solidFill>
+                <a:effectLst/>
+                <a:latin typeface="Arial" charset="0"/>
+              </a:endParaRPr>
+            </a:p>
+          </p:txBody>
+        </p:sp>
+        <p:sp>
+          <p:nvSpPr>
+            <p:cNvPr id="32" name="TextBox 31">
+              <a:extLst>
+                <a:ext uri="{FF2B5EF4-FFF2-40B4-BE49-F238E27FC236}">
+                  <a16:creationId xmlns:a16="http://schemas.microsoft.com/office/drawing/2014/main" id="{EFB6FF60-19BC-4105-BB1A-AF77A9CC7E7D}"/>
+                </a:ext>
+              </a:extLst>
+            </p:cNvPr>
+            <p:cNvSpPr txBox="1"/>
+            <p:nvPr/>
+          </p:nvSpPr>
+          <p:spPr>
+            <a:xfrm>
+              <a:off x="6011123" y="3444424"/>
+              <a:ext cx="1685077" cy="369332"/>
+            </a:xfrm>
+            <a:prstGeom prst="rect">
+              <a:avLst/>
+            </a:prstGeom>
+            <a:noFill/>
+          </p:spPr>
+          <p:txBody>
+            <a:bodyPr wrap="none" rtlCol="0">
+              <a:spAutoFit/>
+            </a:bodyPr>
+            <a:lstStyle/>
+            <a:p>
+              <a:r>
+                <a:rPr lang="en-US" sz="1800" dirty="0"/>
+                <a:t>temporary part</a:t>
+              </a:r>
+            </a:p>
+          </p:txBody>
+        </p:sp>
       </p:grpSp>
     </p:spTree>
     <p:extLst>
@@ -12732,10 +13130,10 @@
       </p:sp>
       <p:grpSp>
         <p:nvGrpSpPr>
-          <p:cNvPr id="7" name="Group 6">
+          <p:cNvPr id="3" name="Group 2">
             <a:extLst>
               <a:ext uri="{FF2B5EF4-FFF2-40B4-BE49-F238E27FC236}">
-                <a16:creationId xmlns:a16="http://schemas.microsoft.com/office/drawing/2014/main" id="{27D29FF3-431B-4D1D-9587-18D0DF6FD9F0}"/>
+                <a16:creationId xmlns:a16="http://schemas.microsoft.com/office/drawing/2014/main" id="{048AC349-9E82-4EE0-827C-19D82A50A3F9}"/>
               </a:ext>
             </a:extLst>
           </p:cNvPr>
@@ -12745,9 +13143,9 @@
         <p:grpSpPr>
           <a:xfrm>
             <a:off x="1676400" y="1981200"/>
-            <a:ext cx="4419600" cy="4023360"/>
+            <a:ext cx="6019800" cy="4023360"/>
             <a:chOff x="1676400" y="1981200"/>
-            <a:chExt cx="4419600" cy="4023360"/>
+            <a:chExt cx="6019800" cy="4023360"/>
           </a:xfrm>
         </p:grpSpPr>
         <p:sp>
@@ -13511,6 +13909,110 @@
             <a:effectLst/>
           </p:spPr>
         </p:cxnSp>
+        <p:sp>
+          <p:nvSpPr>
+            <p:cNvPr id="31" name="Right Brace 30">
+              <a:extLst>
+                <a:ext uri="{FF2B5EF4-FFF2-40B4-BE49-F238E27FC236}">
+                  <a16:creationId xmlns:a16="http://schemas.microsoft.com/office/drawing/2014/main" id="{AB6DB393-1A1D-40E6-9323-6D59B9AD4553}"/>
+                </a:ext>
+              </a:extLst>
+            </p:cNvPr>
+            <p:cNvSpPr/>
+            <p:nvPr/>
+          </p:nvSpPr>
+          <p:spPr bwMode="auto">
+            <a:xfrm>
+              <a:off x="5867400" y="3080450"/>
+              <a:ext cx="152400" cy="1097280"/>
+            </a:xfrm>
+            <a:prstGeom prst="rightBrace">
+              <a:avLst/>
+            </a:prstGeom>
+            <a:noFill/>
+            <a:ln w="9525" cap="flat" cmpd="sng" algn="ctr">
+              <a:solidFill>
+                <a:schemeClr val="tx1"/>
+              </a:solidFill>
+              <a:prstDash val="solid"/>
+              <a:round/>
+              <a:headEnd type="none" w="med" len="med"/>
+              <a:tailEnd type="none" w="med" len="med"/>
+            </a:ln>
+            <a:effectLst/>
+          </p:spPr>
+          <p:txBody>
+            <a:bodyPr vert="horz" wrap="none" lIns="92075" tIns="46038" rIns="92075" bIns="46038" numCol="1" rtlCol="0" anchor="ctr" anchorCtr="0" compatLnSpc="1">
+              <a:prstTxWarp prst="textNoShape">
+                <a:avLst/>
+              </a:prstTxWarp>
+            </a:bodyPr>
+            <a:lstStyle/>
+            <a:p>
+              <a:pPr marL="0" marR="0" indent="0" algn="ctr" defTabSz="914400" rtl="0" eaLnBrk="0" fontAlgn="base" latinLnBrk="0" hangingPunct="0">
+                <a:lnSpc>
+                  <a:spcPct val="100000"/>
+                </a:lnSpc>
+                <a:spcBef>
+                  <a:spcPct val="0"/>
+                </a:spcBef>
+                <a:spcAft>
+                  <a:spcPct val="0"/>
+                </a:spcAft>
+                <a:buClrTx/>
+                <a:buSzTx/>
+                <a:buFontTx/>
+                <a:buNone/>
+                <a:tabLst/>
+              </a:pPr>
+              <a:endParaRPr kumimoji="0" lang="en-US" sz="2400" b="0" i="0" u="none" strike="noStrike" cap="none" normalizeH="0" baseline="0">
+                <a:ln>
+                  <a:noFill/>
+                </a:ln>
+                <a:solidFill>
+                  <a:schemeClr val="tx1"/>
+                </a:solidFill>
+                <a:effectLst/>
+                <a:latin typeface="Arial" charset="0"/>
+              </a:endParaRPr>
+            </a:p>
+          </p:txBody>
+        </p:sp>
+        <p:sp>
+          <p:nvSpPr>
+            <p:cNvPr id="32" name="TextBox 31">
+              <a:extLst>
+                <a:ext uri="{FF2B5EF4-FFF2-40B4-BE49-F238E27FC236}">
+                  <a16:creationId xmlns:a16="http://schemas.microsoft.com/office/drawing/2014/main" id="{67EAA9BC-6691-43FB-8AF6-71B768CE5A14}"/>
+                </a:ext>
+              </a:extLst>
+            </p:cNvPr>
+            <p:cNvSpPr txBox="1"/>
+            <p:nvPr/>
+          </p:nvSpPr>
+          <p:spPr>
+            <a:xfrm>
+              <a:off x="6011123" y="3444424"/>
+              <a:ext cx="1685077" cy="369332"/>
+            </a:xfrm>
+            <a:prstGeom prst="rect">
+              <a:avLst/>
+            </a:prstGeom>
+            <a:noFill/>
+          </p:spPr>
+          <p:txBody>
+            <a:bodyPr wrap="none" rtlCol="0">
+              <a:spAutoFit/>
+            </a:bodyPr>
+            <a:lstStyle/>
+            <a:p>
+              <a:r>
+                <a:rPr lang="en-US" sz="1800" dirty="0"/>
+                <a:t>temporary part</a:t>
+              </a:r>
+            </a:p>
+          </p:txBody>
+        </p:sp>
       </p:grpSp>
     </p:spTree>
     <p:extLst>
@@ -13661,10 +14163,10 @@
       </p:sp>
       <p:grpSp>
         <p:nvGrpSpPr>
-          <p:cNvPr id="8" name="Group 7">
+          <p:cNvPr id="3" name="Group 2">
             <a:extLst>
               <a:ext uri="{FF2B5EF4-FFF2-40B4-BE49-F238E27FC236}">
-                <a16:creationId xmlns:a16="http://schemas.microsoft.com/office/drawing/2014/main" id="{42465284-2D6C-428E-B381-27F4EFFD93B5}"/>
+                <a16:creationId xmlns:a16="http://schemas.microsoft.com/office/drawing/2014/main" id="{D8B2CD4B-300E-4C3B-9714-7DE45F2BC089}"/>
               </a:ext>
             </a:extLst>
           </p:cNvPr>
@@ -13674,9 +14176,9 @@
         <p:grpSpPr>
           <a:xfrm>
             <a:off x="1676400" y="1981200"/>
-            <a:ext cx="4419600" cy="4023360"/>
+            <a:ext cx="6019800" cy="4023360"/>
             <a:chOff x="1676400" y="1981200"/>
-            <a:chExt cx="4419600" cy="4023360"/>
+            <a:chExt cx="6019800" cy="4023360"/>
           </a:xfrm>
         </p:grpSpPr>
         <p:sp>
@@ -14362,6 +14864,110 @@
             <a:effectLst/>
           </p:spPr>
         </p:cxnSp>
+        <p:sp>
+          <p:nvSpPr>
+            <p:cNvPr id="24" name="Right Brace 23">
+              <a:extLst>
+                <a:ext uri="{FF2B5EF4-FFF2-40B4-BE49-F238E27FC236}">
+                  <a16:creationId xmlns:a16="http://schemas.microsoft.com/office/drawing/2014/main" id="{6C97930C-E16A-47DE-8EB8-70D14A1B782A}"/>
+                </a:ext>
+              </a:extLst>
+            </p:cNvPr>
+            <p:cNvSpPr/>
+            <p:nvPr/>
+          </p:nvSpPr>
+          <p:spPr bwMode="auto">
+            <a:xfrm>
+              <a:off x="5867400" y="3080450"/>
+              <a:ext cx="152400" cy="731520"/>
+            </a:xfrm>
+            <a:prstGeom prst="rightBrace">
+              <a:avLst/>
+            </a:prstGeom>
+            <a:noFill/>
+            <a:ln w="9525" cap="flat" cmpd="sng" algn="ctr">
+              <a:solidFill>
+                <a:schemeClr val="tx1"/>
+              </a:solidFill>
+              <a:prstDash val="solid"/>
+              <a:round/>
+              <a:headEnd type="none" w="med" len="med"/>
+              <a:tailEnd type="none" w="med" len="med"/>
+            </a:ln>
+            <a:effectLst/>
+          </p:spPr>
+          <p:txBody>
+            <a:bodyPr vert="horz" wrap="none" lIns="92075" tIns="46038" rIns="92075" bIns="46038" numCol="1" rtlCol="0" anchor="ctr" anchorCtr="0" compatLnSpc="1">
+              <a:prstTxWarp prst="textNoShape">
+                <a:avLst/>
+              </a:prstTxWarp>
+            </a:bodyPr>
+            <a:lstStyle/>
+            <a:p>
+              <a:pPr marL="0" marR="0" indent="0" algn="ctr" defTabSz="914400" rtl="0" eaLnBrk="0" fontAlgn="base" latinLnBrk="0" hangingPunct="0">
+                <a:lnSpc>
+                  <a:spcPct val="100000"/>
+                </a:lnSpc>
+                <a:spcBef>
+                  <a:spcPct val="0"/>
+                </a:spcBef>
+                <a:spcAft>
+                  <a:spcPct val="0"/>
+                </a:spcAft>
+                <a:buClrTx/>
+                <a:buSzTx/>
+                <a:buFontTx/>
+                <a:buNone/>
+                <a:tabLst/>
+              </a:pPr>
+              <a:endParaRPr kumimoji="0" lang="en-US" sz="2400" b="0" i="0" u="none" strike="noStrike" cap="none" normalizeH="0" baseline="0">
+                <a:ln>
+                  <a:noFill/>
+                </a:ln>
+                <a:solidFill>
+                  <a:schemeClr val="tx1"/>
+                </a:solidFill>
+                <a:effectLst/>
+                <a:latin typeface="Arial" charset="0"/>
+              </a:endParaRPr>
+            </a:p>
+          </p:txBody>
+        </p:sp>
+        <p:sp>
+          <p:nvSpPr>
+            <p:cNvPr id="25" name="TextBox 24">
+              <a:extLst>
+                <a:ext uri="{FF2B5EF4-FFF2-40B4-BE49-F238E27FC236}">
+                  <a16:creationId xmlns:a16="http://schemas.microsoft.com/office/drawing/2014/main" id="{5B9499AD-7C9D-46BE-B823-89EA63D09137}"/>
+                </a:ext>
+              </a:extLst>
+            </p:cNvPr>
+            <p:cNvSpPr txBox="1"/>
+            <p:nvPr/>
+          </p:nvSpPr>
+          <p:spPr>
+            <a:xfrm>
+              <a:off x="6011123" y="3261544"/>
+              <a:ext cx="1685077" cy="369332"/>
+            </a:xfrm>
+            <a:prstGeom prst="rect">
+              <a:avLst/>
+            </a:prstGeom>
+            <a:noFill/>
+          </p:spPr>
+          <p:txBody>
+            <a:bodyPr wrap="none" rtlCol="0">
+              <a:spAutoFit/>
+            </a:bodyPr>
+            <a:lstStyle/>
+            <a:p>
+              <a:r>
+                <a:rPr lang="en-US" sz="1800" dirty="0"/>
+                <a:t>temporary part</a:t>
+              </a:r>
+            </a:p>
+          </p:txBody>
+        </p:sp>
       </p:grpSp>
     </p:spTree>
     <p:extLst>
@@ -14512,10 +15118,10 @@
       </p:sp>
       <p:grpSp>
         <p:nvGrpSpPr>
-          <p:cNvPr id="7" name="Group 6">
+          <p:cNvPr id="3" name="Group 2">
             <a:extLst>
               <a:ext uri="{FF2B5EF4-FFF2-40B4-BE49-F238E27FC236}">
-                <a16:creationId xmlns:a16="http://schemas.microsoft.com/office/drawing/2014/main" id="{BB8BF56F-6CCE-4863-B102-CDFF90F6F7DF}"/>
+                <a16:creationId xmlns:a16="http://schemas.microsoft.com/office/drawing/2014/main" id="{1EFBBD1F-0C68-4E97-8EAF-0E32C999FD0A}"/>
               </a:ext>
             </a:extLst>
           </p:cNvPr>
@@ -14525,9 +15131,9 @@
         <p:grpSpPr>
           <a:xfrm>
             <a:off x="1676400" y="1981200"/>
-            <a:ext cx="4419600" cy="4023360"/>
+            <a:ext cx="6019800" cy="4023360"/>
             <a:chOff x="1676400" y="1981200"/>
-            <a:chExt cx="4419600" cy="4023360"/>
+            <a:chExt cx="6019800" cy="4023360"/>
           </a:xfrm>
         </p:grpSpPr>
         <p:sp>
@@ -15291,6 +15897,110 @@
             <a:effectLst/>
           </p:spPr>
         </p:cxnSp>
+        <p:sp>
+          <p:nvSpPr>
+            <p:cNvPr id="26" name="Right Brace 25">
+              <a:extLst>
+                <a:ext uri="{FF2B5EF4-FFF2-40B4-BE49-F238E27FC236}">
+                  <a16:creationId xmlns:a16="http://schemas.microsoft.com/office/drawing/2014/main" id="{442584E8-A3AD-40B6-ACB2-0D770F249866}"/>
+                </a:ext>
+              </a:extLst>
+            </p:cNvPr>
+            <p:cNvSpPr/>
+            <p:nvPr/>
+          </p:nvSpPr>
+          <p:spPr bwMode="auto">
+            <a:xfrm>
+              <a:off x="5867400" y="3080450"/>
+              <a:ext cx="152400" cy="1097280"/>
+            </a:xfrm>
+            <a:prstGeom prst="rightBrace">
+              <a:avLst/>
+            </a:prstGeom>
+            <a:noFill/>
+            <a:ln w="9525" cap="flat" cmpd="sng" algn="ctr">
+              <a:solidFill>
+                <a:schemeClr val="tx1"/>
+              </a:solidFill>
+              <a:prstDash val="solid"/>
+              <a:round/>
+              <a:headEnd type="none" w="med" len="med"/>
+              <a:tailEnd type="none" w="med" len="med"/>
+            </a:ln>
+            <a:effectLst/>
+          </p:spPr>
+          <p:txBody>
+            <a:bodyPr vert="horz" wrap="none" lIns="92075" tIns="46038" rIns="92075" bIns="46038" numCol="1" rtlCol="0" anchor="ctr" anchorCtr="0" compatLnSpc="1">
+              <a:prstTxWarp prst="textNoShape">
+                <a:avLst/>
+              </a:prstTxWarp>
+            </a:bodyPr>
+            <a:lstStyle/>
+            <a:p>
+              <a:pPr marL="0" marR="0" indent="0" algn="ctr" defTabSz="914400" rtl="0" eaLnBrk="0" fontAlgn="base" latinLnBrk="0" hangingPunct="0">
+                <a:lnSpc>
+                  <a:spcPct val="100000"/>
+                </a:lnSpc>
+                <a:spcBef>
+                  <a:spcPct val="0"/>
+                </a:spcBef>
+                <a:spcAft>
+                  <a:spcPct val="0"/>
+                </a:spcAft>
+                <a:buClrTx/>
+                <a:buSzTx/>
+                <a:buFontTx/>
+                <a:buNone/>
+                <a:tabLst/>
+              </a:pPr>
+              <a:endParaRPr kumimoji="0" lang="en-US" sz="2400" b="0" i="0" u="none" strike="noStrike" cap="none" normalizeH="0" baseline="0">
+                <a:ln>
+                  <a:noFill/>
+                </a:ln>
+                <a:solidFill>
+                  <a:schemeClr val="tx1"/>
+                </a:solidFill>
+                <a:effectLst/>
+                <a:latin typeface="Arial" charset="0"/>
+              </a:endParaRPr>
+            </a:p>
+          </p:txBody>
+        </p:sp>
+        <p:sp>
+          <p:nvSpPr>
+            <p:cNvPr id="27" name="TextBox 26">
+              <a:extLst>
+                <a:ext uri="{FF2B5EF4-FFF2-40B4-BE49-F238E27FC236}">
+                  <a16:creationId xmlns:a16="http://schemas.microsoft.com/office/drawing/2014/main" id="{B39C4CAD-1E85-4386-A13F-43104C6853AB}"/>
+                </a:ext>
+              </a:extLst>
+            </p:cNvPr>
+            <p:cNvSpPr txBox="1"/>
+            <p:nvPr/>
+          </p:nvSpPr>
+          <p:spPr>
+            <a:xfrm>
+              <a:off x="6011123" y="3444424"/>
+              <a:ext cx="1685077" cy="369332"/>
+            </a:xfrm>
+            <a:prstGeom prst="rect">
+              <a:avLst/>
+            </a:prstGeom>
+            <a:noFill/>
+          </p:spPr>
+          <p:txBody>
+            <a:bodyPr wrap="none" rtlCol="0">
+              <a:spAutoFit/>
+            </a:bodyPr>
+            <a:lstStyle/>
+            <a:p>
+              <a:r>
+                <a:rPr lang="en-US" sz="1800" dirty="0"/>
+                <a:t>temporary part</a:t>
+              </a:r>
+            </a:p>
+          </p:txBody>
+        </p:sp>
       </p:grpSp>
     </p:spTree>
     <p:extLst>
@@ -15441,10 +16151,10 @@
       </p:sp>
       <p:grpSp>
         <p:nvGrpSpPr>
-          <p:cNvPr id="7" name="Group 6">
+          <p:cNvPr id="3" name="Group 2">
             <a:extLst>
               <a:ext uri="{FF2B5EF4-FFF2-40B4-BE49-F238E27FC236}">
-                <a16:creationId xmlns:a16="http://schemas.microsoft.com/office/drawing/2014/main" id="{01E83BD7-9DA2-48A2-866C-F78E751093FB}"/>
+                <a16:creationId xmlns:a16="http://schemas.microsoft.com/office/drawing/2014/main" id="{C76E92D2-5EE6-4911-ACDC-BB25B6F41DC2}"/>
               </a:ext>
             </a:extLst>
           </p:cNvPr>
@@ -15454,9 +16164,9 @@
         <p:grpSpPr>
           <a:xfrm>
             <a:off x="1676400" y="1981200"/>
-            <a:ext cx="4419600" cy="4023360"/>
+            <a:ext cx="6019800" cy="4023360"/>
             <a:chOff x="1676400" y="1981200"/>
-            <a:chExt cx="4419600" cy="4023360"/>
+            <a:chExt cx="6019800" cy="4023360"/>
           </a:xfrm>
         </p:grpSpPr>
         <p:sp>
@@ -16220,6 +16930,110 @@
             <a:effectLst/>
           </p:spPr>
         </p:cxnSp>
+        <p:sp>
+          <p:nvSpPr>
+            <p:cNvPr id="26" name="Right Brace 25">
+              <a:extLst>
+                <a:ext uri="{FF2B5EF4-FFF2-40B4-BE49-F238E27FC236}">
+                  <a16:creationId xmlns:a16="http://schemas.microsoft.com/office/drawing/2014/main" id="{02EAEFFE-D2EE-4265-967C-3FC93ABF6C05}"/>
+                </a:ext>
+              </a:extLst>
+            </p:cNvPr>
+            <p:cNvSpPr/>
+            <p:nvPr/>
+          </p:nvSpPr>
+          <p:spPr bwMode="auto">
+            <a:xfrm>
+              <a:off x="5867400" y="3080450"/>
+              <a:ext cx="152400" cy="1097280"/>
+            </a:xfrm>
+            <a:prstGeom prst="rightBrace">
+              <a:avLst/>
+            </a:prstGeom>
+            <a:noFill/>
+            <a:ln w="9525" cap="flat" cmpd="sng" algn="ctr">
+              <a:solidFill>
+                <a:schemeClr val="tx1"/>
+              </a:solidFill>
+              <a:prstDash val="solid"/>
+              <a:round/>
+              <a:headEnd type="none" w="med" len="med"/>
+              <a:tailEnd type="none" w="med" len="med"/>
+            </a:ln>
+            <a:effectLst/>
+          </p:spPr>
+          <p:txBody>
+            <a:bodyPr vert="horz" wrap="none" lIns="92075" tIns="46038" rIns="92075" bIns="46038" numCol="1" rtlCol="0" anchor="ctr" anchorCtr="0" compatLnSpc="1">
+              <a:prstTxWarp prst="textNoShape">
+                <a:avLst/>
+              </a:prstTxWarp>
+            </a:bodyPr>
+            <a:lstStyle/>
+            <a:p>
+              <a:pPr marL="0" marR="0" indent="0" algn="ctr" defTabSz="914400" rtl="0" eaLnBrk="0" fontAlgn="base" latinLnBrk="0" hangingPunct="0">
+                <a:lnSpc>
+                  <a:spcPct val="100000"/>
+                </a:lnSpc>
+                <a:spcBef>
+                  <a:spcPct val="0"/>
+                </a:spcBef>
+                <a:spcAft>
+                  <a:spcPct val="0"/>
+                </a:spcAft>
+                <a:buClrTx/>
+                <a:buSzTx/>
+                <a:buFontTx/>
+                <a:buNone/>
+                <a:tabLst/>
+              </a:pPr>
+              <a:endParaRPr kumimoji="0" lang="en-US" sz="2400" b="0" i="0" u="none" strike="noStrike" cap="none" normalizeH="0" baseline="0">
+                <a:ln>
+                  <a:noFill/>
+                </a:ln>
+                <a:solidFill>
+                  <a:schemeClr val="tx1"/>
+                </a:solidFill>
+                <a:effectLst/>
+                <a:latin typeface="Arial" charset="0"/>
+              </a:endParaRPr>
+            </a:p>
+          </p:txBody>
+        </p:sp>
+        <p:sp>
+          <p:nvSpPr>
+            <p:cNvPr id="27" name="TextBox 26">
+              <a:extLst>
+                <a:ext uri="{FF2B5EF4-FFF2-40B4-BE49-F238E27FC236}">
+                  <a16:creationId xmlns:a16="http://schemas.microsoft.com/office/drawing/2014/main" id="{7B883857-8DE5-4825-8357-4927F7630A9C}"/>
+                </a:ext>
+              </a:extLst>
+            </p:cNvPr>
+            <p:cNvSpPr txBox="1"/>
+            <p:nvPr/>
+          </p:nvSpPr>
+          <p:spPr>
+            <a:xfrm>
+              <a:off x="6011123" y="3444424"/>
+              <a:ext cx="1685077" cy="369332"/>
+            </a:xfrm>
+            <a:prstGeom prst="rect">
+              <a:avLst/>
+            </a:prstGeom>
+            <a:noFill/>
+          </p:spPr>
+          <p:txBody>
+            <a:bodyPr wrap="none" rtlCol="0">
+              <a:spAutoFit/>
+            </a:bodyPr>
+            <a:lstStyle/>
+            <a:p>
+              <a:r>
+                <a:rPr lang="en-US" sz="1800" dirty="0"/>
+                <a:t>temporary part</a:t>
+              </a:r>
+            </a:p>
+          </p:txBody>
+        </p:sp>
       </p:grpSp>
     </p:spTree>
     <p:extLst>
@@ -16370,10 +17184,10 @@
       </p:sp>
       <p:grpSp>
         <p:nvGrpSpPr>
-          <p:cNvPr id="8" name="Group 7">
+          <p:cNvPr id="3" name="Group 2">
             <a:extLst>
               <a:ext uri="{FF2B5EF4-FFF2-40B4-BE49-F238E27FC236}">
-                <a16:creationId xmlns:a16="http://schemas.microsoft.com/office/drawing/2014/main" id="{5828A409-1342-4898-88B7-89A5CFDC28A3}"/>
+                <a16:creationId xmlns:a16="http://schemas.microsoft.com/office/drawing/2014/main" id="{567C2334-23BC-49FA-BD6A-65ACEBD5BDC1}"/>
               </a:ext>
             </a:extLst>
           </p:cNvPr>
@@ -16383,9 +17197,9 @@
         <p:grpSpPr>
           <a:xfrm>
             <a:off x="1676400" y="1981200"/>
-            <a:ext cx="4419600" cy="4023360"/>
+            <a:ext cx="6019800" cy="4023360"/>
             <a:chOff x="1676400" y="1981200"/>
-            <a:chExt cx="4419600" cy="4023360"/>
+            <a:chExt cx="6019800" cy="4023360"/>
           </a:xfrm>
         </p:grpSpPr>
         <p:sp>
@@ -17071,6 +17885,110 @@
             <a:effectLst/>
           </p:spPr>
         </p:cxnSp>
+        <p:sp>
+          <p:nvSpPr>
+            <p:cNvPr id="24" name="Right Brace 23">
+              <a:extLst>
+                <a:ext uri="{FF2B5EF4-FFF2-40B4-BE49-F238E27FC236}">
+                  <a16:creationId xmlns:a16="http://schemas.microsoft.com/office/drawing/2014/main" id="{5C755604-6F0A-4EB3-8702-6AB6E41E6E61}"/>
+                </a:ext>
+              </a:extLst>
+            </p:cNvPr>
+            <p:cNvSpPr/>
+            <p:nvPr/>
+          </p:nvSpPr>
+          <p:spPr bwMode="auto">
+            <a:xfrm>
+              <a:off x="5867400" y="3080450"/>
+              <a:ext cx="152400" cy="731520"/>
+            </a:xfrm>
+            <a:prstGeom prst="rightBrace">
+              <a:avLst/>
+            </a:prstGeom>
+            <a:noFill/>
+            <a:ln w="9525" cap="flat" cmpd="sng" algn="ctr">
+              <a:solidFill>
+                <a:schemeClr val="tx1"/>
+              </a:solidFill>
+              <a:prstDash val="solid"/>
+              <a:round/>
+              <a:headEnd type="none" w="med" len="med"/>
+              <a:tailEnd type="none" w="med" len="med"/>
+            </a:ln>
+            <a:effectLst/>
+          </p:spPr>
+          <p:txBody>
+            <a:bodyPr vert="horz" wrap="none" lIns="92075" tIns="46038" rIns="92075" bIns="46038" numCol="1" rtlCol="0" anchor="ctr" anchorCtr="0" compatLnSpc="1">
+              <a:prstTxWarp prst="textNoShape">
+                <a:avLst/>
+              </a:prstTxWarp>
+            </a:bodyPr>
+            <a:lstStyle/>
+            <a:p>
+              <a:pPr marL="0" marR="0" indent="0" algn="ctr" defTabSz="914400" rtl="0" eaLnBrk="0" fontAlgn="base" latinLnBrk="0" hangingPunct="0">
+                <a:lnSpc>
+                  <a:spcPct val="100000"/>
+                </a:lnSpc>
+                <a:spcBef>
+                  <a:spcPct val="0"/>
+                </a:spcBef>
+                <a:spcAft>
+                  <a:spcPct val="0"/>
+                </a:spcAft>
+                <a:buClrTx/>
+                <a:buSzTx/>
+                <a:buFontTx/>
+                <a:buNone/>
+                <a:tabLst/>
+              </a:pPr>
+              <a:endParaRPr kumimoji="0" lang="en-US" sz="2400" b="0" i="0" u="none" strike="noStrike" cap="none" normalizeH="0" baseline="0">
+                <a:ln>
+                  <a:noFill/>
+                </a:ln>
+                <a:solidFill>
+                  <a:schemeClr val="tx1"/>
+                </a:solidFill>
+                <a:effectLst/>
+                <a:latin typeface="Arial" charset="0"/>
+              </a:endParaRPr>
+            </a:p>
+          </p:txBody>
+        </p:sp>
+        <p:sp>
+          <p:nvSpPr>
+            <p:cNvPr id="25" name="TextBox 24">
+              <a:extLst>
+                <a:ext uri="{FF2B5EF4-FFF2-40B4-BE49-F238E27FC236}">
+                  <a16:creationId xmlns:a16="http://schemas.microsoft.com/office/drawing/2014/main" id="{F6298E95-9D16-4389-B3BB-14EA5A5B1235}"/>
+                </a:ext>
+              </a:extLst>
+            </p:cNvPr>
+            <p:cNvSpPr txBox="1"/>
+            <p:nvPr/>
+          </p:nvSpPr>
+          <p:spPr>
+            <a:xfrm>
+              <a:off x="6011123" y="3261544"/>
+              <a:ext cx="1685077" cy="369332"/>
+            </a:xfrm>
+            <a:prstGeom prst="rect">
+              <a:avLst/>
+            </a:prstGeom>
+            <a:noFill/>
+          </p:spPr>
+          <p:txBody>
+            <a:bodyPr wrap="none" rtlCol="0">
+              <a:spAutoFit/>
+            </a:bodyPr>
+            <a:lstStyle/>
+            <a:p>
+              <a:r>
+                <a:rPr lang="en-US" sz="1800" dirty="0"/>
+                <a:t>temporary part</a:t>
+              </a:r>
+            </a:p>
+          </p:txBody>
+        </p:sp>
       </p:grpSp>
     </p:spTree>
     <p:extLst>
@@ -17219,105 +18137,12 @@
           </a:p>
         </p:txBody>
       </p:sp>
-      <p:sp>
-        <p:nvSpPr>
-          <p:cNvPr id="8" name="TextBox 7">
+      <p:grpSp>
+        <p:nvGrpSpPr>
+          <p:cNvPr id="3" name="Group 2">
             <a:extLst>
               <a:ext uri="{FF2B5EF4-FFF2-40B4-BE49-F238E27FC236}">
-                <a16:creationId xmlns:a16="http://schemas.microsoft.com/office/drawing/2014/main" id="{53B4693E-5CE5-46F9-91CA-18B392465704}"/>
-              </a:ext>
-            </a:extLst>
-          </p:cNvPr>
-          <p:cNvSpPr txBox="1"/>
-          <p:nvPr/>
-        </p:nvSpPr>
-        <p:spPr>
-          <a:xfrm>
-            <a:off x="1981200" y="3733800"/>
-            <a:ext cx="954107" cy="923330"/>
-          </a:xfrm>
-          <a:prstGeom prst="rect">
-            <a:avLst/>
-          </a:prstGeom>
-          <a:noFill/>
-        </p:spPr>
-        <p:txBody>
-          <a:bodyPr wrap="none" rtlCol="0">
-            <a:spAutoFit/>
-          </a:bodyPr>
-          <a:lstStyle/>
-          <a:p>
-            <a:pPr algn="l"/>
-            <a:r>
-              <a:rPr lang="en-US" sz="1800" dirty="0"/>
-              <a:t>stack is</a:t>
-            </a:r>
-          </a:p>
-          <a:p>
-            <a:pPr algn="l"/>
-            <a:r>
-              <a:rPr lang="en-US" sz="1800" dirty="0"/>
-              <a:t>empty</a:t>
-            </a:r>
-          </a:p>
-          <a:p>
-            <a:pPr algn="l"/>
-            <a:r>
-              <a:rPr lang="en-US" sz="1800" dirty="0"/>
-              <a:t>again</a:t>
-            </a:r>
-          </a:p>
-        </p:txBody>
-      </p:sp>
-      <p:sp>
-        <p:nvSpPr>
-          <p:cNvPr id="9" name="TextBox 8">
-            <a:extLst>
-              <a:ext uri="{FF2B5EF4-FFF2-40B4-BE49-F238E27FC236}">
-                <a16:creationId xmlns:a16="http://schemas.microsoft.com/office/drawing/2014/main" id="{802F895B-5A05-4C4B-9383-74D468790203}"/>
-              </a:ext>
-            </a:extLst>
-          </p:cNvPr>
-          <p:cNvSpPr txBox="1"/>
-          <p:nvPr/>
-        </p:nvSpPr>
-        <p:spPr>
-          <a:xfrm>
-            <a:off x="6346839" y="1877696"/>
-            <a:ext cx="1441420" cy="646331"/>
-          </a:xfrm>
-          <a:prstGeom prst="rect">
-            <a:avLst/>
-          </a:prstGeom>
-          <a:noFill/>
-        </p:spPr>
-        <p:txBody>
-          <a:bodyPr wrap="none" rtlCol="0">
-            <a:spAutoFit/>
-          </a:bodyPr>
-          <a:lstStyle/>
-          <a:p>
-            <a:pPr algn="l"/>
-            <a:r>
-              <a:rPr lang="en-US" sz="1800" dirty="0"/>
-              <a:t>x  now has</a:t>
-            </a:r>
-          </a:p>
-          <a:p>
-            <a:pPr algn="l"/>
-            <a:r>
-              <a:rPr lang="en-US" sz="1800" dirty="0"/>
-              <a:t>the value 23</a:t>
-            </a:r>
-          </a:p>
-        </p:txBody>
-      </p:sp>
-      <p:grpSp>
-        <p:nvGrpSpPr>
-          <p:cNvPr id="26" name="Group 25">
-            <a:extLst>
-              <a:ext uri="{FF2B5EF4-FFF2-40B4-BE49-F238E27FC236}">
-                <a16:creationId xmlns:a16="http://schemas.microsoft.com/office/drawing/2014/main" id="{03459A83-503F-407C-BD12-02A1FFC989A8}"/>
+                <a16:creationId xmlns:a16="http://schemas.microsoft.com/office/drawing/2014/main" id="{9D929828-9981-458C-81DD-6CC5FA050961}"/>
               </a:ext>
             </a:extLst>
           </p:cNvPr>
@@ -17326,12 +18151,55 @@
         </p:nvGrpSpPr>
         <p:grpSpPr>
           <a:xfrm>
-            <a:off x="1676400" y="1981200"/>
-            <a:ext cx="4419600" cy="4023360"/>
-            <a:chOff x="1676400" y="1981200"/>
-            <a:chExt cx="4419600" cy="4023360"/>
+            <a:off x="1676400" y="1877696"/>
+            <a:ext cx="6111859" cy="4126864"/>
+            <a:chOff x="1676400" y="1877696"/>
+            <a:chExt cx="6111859" cy="4126864"/>
           </a:xfrm>
         </p:grpSpPr>
+        <p:sp>
+          <p:nvSpPr>
+            <p:cNvPr id="9" name="TextBox 8">
+              <a:extLst>
+                <a:ext uri="{FF2B5EF4-FFF2-40B4-BE49-F238E27FC236}">
+                  <a16:creationId xmlns:a16="http://schemas.microsoft.com/office/drawing/2014/main" id="{802F895B-5A05-4C4B-9383-74D468790203}"/>
+                </a:ext>
+              </a:extLst>
+            </p:cNvPr>
+            <p:cNvSpPr txBox="1"/>
+            <p:nvPr/>
+          </p:nvSpPr>
+          <p:spPr>
+            <a:xfrm>
+              <a:off x="6346839" y="1877696"/>
+              <a:ext cx="1441420" cy="646331"/>
+            </a:xfrm>
+            <a:prstGeom prst="rect">
+              <a:avLst/>
+            </a:prstGeom>
+            <a:noFill/>
+          </p:spPr>
+          <p:txBody>
+            <a:bodyPr wrap="none" rtlCol="0">
+              <a:spAutoFit/>
+            </a:bodyPr>
+            <a:lstStyle/>
+            <a:p>
+              <a:pPr algn="l"/>
+              <a:r>
+                <a:rPr lang="en-US" sz="1800" dirty="0"/>
+                <a:t>x  now has</a:t>
+              </a:r>
+            </a:p>
+            <a:p>
+              <a:pPr algn="l"/>
+              <a:r>
+                <a:rPr lang="en-US" sz="1800" dirty="0"/>
+                <a:t>the value 23</a:t>
+              </a:r>
+            </a:p>
+          </p:txBody>
+        </p:sp>
         <p:sp>
           <p:nvSpPr>
             <p:cNvPr id="10" name="Rectangle 4">
@@ -17862,6 +18730,49 @@
             <a:effectLst/>
           </p:spPr>
         </p:cxnSp>
+        <p:sp>
+          <p:nvSpPr>
+            <p:cNvPr id="22" name="TextBox 21">
+              <a:extLst>
+                <a:ext uri="{FF2B5EF4-FFF2-40B4-BE49-F238E27FC236}">
+                  <a16:creationId xmlns:a16="http://schemas.microsoft.com/office/drawing/2014/main" id="{ECE37F1D-BB79-4947-BEDC-232DDEE7386E}"/>
+                </a:ext>
+              </a:extLst>
+            </p:cNvPr>
+            <p:cNvSpPr txBox="1"/>
+            <p:nvPr/>
+          </p:nvSpPr>
+          <p:spPr>
+            <a:xfrm>
+              <a:off x="5791200" y="3113809"/>
+              <a:ext cx="1685077" cy="646331"/>
+            </a:xfrm>
+            <a:prstGeom prst="rect">
+              <a:avLst/>
+            </a:prstGeom>
+            <a:noFill/>
+          </p:spPr>
+          <p:txBody>
+            <a:bodyPr wrap="none" rtlCol="0">
+              <a:spAutoFit/>
+            </a:bodyPr>
+            <a:lstStyle/>
+            <a:p>
+              <a:pPr algn="l"/>
+              <a:r>
+                <a:rPr lang="en-US" sz="1800" dirty="0"/>
+                <a:t>temporary part</a:t>
+              </a:r>
+            </a:p>
+            <a:p>
+              <a:pPr algn="l"/>
+              <a:r>
+                <a:rPr lang="en-US" sz="1800" dirty="0"/>
+                <a:t>is empty again</a:t>
+              </a:r>
+            </a:p>
+          </p:txBody>
+        </p:sp>
       </p:grpSp>
     </p:spTree>
     <p:extLst>

</xml_diff>